<commit_message>
final push from me. have fun whoever continues this project
</commit_message>
<xml_diff>
--- a/documentation/basic raspberry-pico controller setup.pptx
+++ b/documentation/basic raspberry-pico controller setup.pptx
@@ -172,64 +172,72 @@
     </pc:docChg>
   </pc:docChgLst>
   <pc:docChgLst>
-    <pc:chgData name="Middel, Niek" userId="S::170564@student.horizoncollege.nl::388d0f64-2d47-4e5c-8ec5-f2cea16a3fdd" providerId="AD" clId="Web-{BA301EA0-E136-420E-A7B1-071BFC1BAAC4}"/>
+    <pc:chgData name="Middel, Niek" userId="S::170564@student.horizoncollege.nl::388d0f64-2d47-4e5c-8ec5-f2cea16a3fdd" providerId="AD" clId="Web-{2BF36AF2-3E90-412A-87CF-022F1E0C6D66}"/>
     <pc:docChg chg="modSld">
-      <pc:chgData name="Middel, Niek" userId="S::170564@student.horizoncollege.nl::388d0f64-2d47-4e5c-8ec5-f2cea16a3fdd" providerId="AD" clId="Web-{BA301EA0-E136-420E-A7B1-071BFC1BAAC4}" dt="2024-07-08T08:32:26.640" v="15" actId="1076"/>
+      <pc:chgData name="Middel, Niek" userId="S::170564@student.horizoncollege.nl::388d0f64-2d47-4e5c-8ec5-f2cea16a3fdd" providerId="AD" clId="Web-{2BF36AF2-3E90-412A-87CF-022F1E0C6D66}" dt="2024-07-08T08:46:15.267" v="0"/>
       <pc:docMkLst>
         <pc:docMk/>
       </pc:docMkLst>
-      <pc:sldChg chg="addSp modSp">
-        <pc:chgData name="Middel, Niek" userId="S::170564@student.horizoncollege.nl::388d0f64-2d47-4e5c-8ec5-f2cea16a3fdd" providerId="AD" clId="Web-{BA301EA0-E136-420E-A7B1-071BFC1BAAC4}" dt="2024-07-08T08:32:26.640" v="15" actId="1076"/>
+      <pc:sldChg chg="addSp modSp mod setBg">
+        <pc:chgData name="Middel, Niek" userId="S::170564@student.horizoncollege.nl::388d0f64-2d47-4e5c-8ec5-f2cea16a3fdd" providerId="AD" clId="Web-{2BF36AF2-3E90-412A-87CF-022F1E0C6D66}" dt="2024-07-08T08:46:15.267" v="0"/>
         <pc:sldMkLst>
           <pc:docMk/>
-          <pc:sldMk cId="2951057828" sldId="257"/>
+          <pc:sldMk cId="3351439039" sldId="256"/>
         </pc:sldMkLst>
-        <pc:picChg chg="add mod">
-          <ac:chgData name="Middel, Niek" userId="S::170564@student.horizoncollege.nl::388d0f64-2d47-4e5c-8ec5-f2cea16a3fdd" providerId="AD" clId="Web-{BA301EA0-E136-420E-A7B1-071BFC1BAAC4}" dt="2024-07-08T08:32:20.968" v="13" actId="1076"/>
+        <pc:spChg chg="mod">
+          <ac:chgData name="Middel, Niek" userId="S::170564@student.horizoncollege.nl::388d0f64-2d47-4e5c-8ec5-f2cea16a3fdd" providerId="AD" clId="Web-{2BF36AF2-3E90-412A-87CF-022F1E0C6D66}" dt="2024-07-08T08:46:15.267" v="0"/>
+          <ac:spMkLst>
+            <pc:docMk/>
+            <pc:sldMk cId="3351439039" sldId="256"/>
+            <ac:spMk id="2" creationId="{00000000-0000-0000-0000-000000000000}"/>
+          </ac:spMkLst>
+        </pc:spChg>
+        <pc:spChg chg="mod">
+          <ac:chgData name="Middel, Niek" userId="S::170564@student.horizoncollege.nl::388d0f64-2d47-4e5c-8ec5-f2cea16a3fdd" providerId="AD" clId="Web-{2BF36AF2-3E90-412A-87CF-022F1E0C6D66}" dt="2024-07-08T08:46:15.267" v="0"/>
+          <ac:spMkLst>
+            <pc:docMk/>
+            <pc:sldMk cId="3351439039" sldId="256"/>
+            <ac:spMk id="3" creationId="{00000000-0000-0000-0000-000000000000}"/>
+          </ac:spMkLst>
+        </pc:spChg>
+        <pc:spChg chg="add">
+          <ac:chgData name="Middel, Niek" userId="S::170564@student.horizoncollege.nl::388d0f64-2d47-4e5c-8ec5-f2cea16a3fdd" providerId="AD" clId="Web-{2BF36AF2-3E90-412A-87CF-022F1E0C6D66}" dt="2024-07-08T08:46:15.267" v="0"/>
+          <ac:spMkLst>
+            <pc:docMk/>
+            <pc:sldMk cId="3351439039" sldId="256"/>
+            <ac:spMk id="9" creationId="{0671A8AE-40A1-4631-A6B8-581AFF065482}"/>
+          </ac:spMkLst>
+        </pc:spChg>
+        <pc:spChg chg="add">
+          <ac:chgData name="Middel, Niek" userId="S::170564@student.horizoncollege.nl::388d0f64-2d47-4e5c-8ec5-f2cea16a3fdd" providerId="AD" clId="Web-{2BF36AF2-3E90-412A-87CF-022F1E0C6D66}" dt="2024-07-08T08:46:15.267" v="0"/>
+          <ac:spMkLst>
+            <pc:docMk/>
+            <pc:sldMk cId="3351439039" sldId="256"/>
+            <ac:spMk id="11" creationId="{AB58EF07-17C2-48CF-ABB0-EEF1F17CB8F0}"/>
+          </ac:spMkLst>
+        </pc:spChg>
+        <pc:spChg chg="add">
+          <ac:chgData name="Middel, Niek" userId="S::170564@student.horizoncollege.nl::388d0f64-2d47-4e5c-8ec5-f2cea16a3fdd" providerId="AD" clId="Web-{2BF36AF2-3E90-412A-87CF-022F1E0C6D66}" dt="2024-07-08T08:46:15.267" v="0"/>
+          <ac:spMkLst>
+            <pc:docMk/>
+            <pc:sldMk cId="3351439039" sldId="256"/>
+            <ac:spMk id="13" creationId="{AF2F604E-43BE-4DC3-B983-E071523364F8}"/>
+          </ac:spMkLst>
+        </pc:spChg>
+        <pc:spChg chg="add">
+          <ac:chgData name="Middel, Niek" userId="S::170564@student.horizoncollege.nl::388d0f64-2d47-4e5c-8ec5-f2cea16a3fdd" providerId="AD" clId="Web-{2BF36AF2-3E90-412A-87CF-022F1E0C6D66}" dt="2024-07-08T08:46:15.267" v="0"/>
+          <ac:spMkLst>
+            <pc:docMk/>
+            <pc:sldMk cId="3351439039" sldId="256"/>
+            <ac:spMk id="15" creationId="{08C9B587-E65E-4B52-B37C-ABEBB6E87928}"/>
+          </ac:spMkLst>
+        </pc:spChg>
+        <pc:picChg chg="add">
+          <ac:chgData name="Middel, Niek" userId="S::170564@student.horizoncollege.nl::388d0f64-2d47-4e5c-8ec5-f2cea16a3fdd" providerId="AD" clId="Web-{2BF36AF2-3E90-412A-87CF-022F1E0C6D66}" dt="2024-07-08T08:46:15.267" v="0"/>
           <ac:picMkLst>
             <pc:docMk/>
-            <pc:sldMk cId="2951057828" sldId="257"/>
-            <ac:picMk id="3" creationId="{5E0E28E1-4675-638B-C3A8-3A7B122E9C38}"/>
-          </ac:picMkLst>
-        </pc:picChg>
-        <pc:picChg chg="mod">
-          <ac:chgData name="Middel, Niek" userId="S::170564@student.horizoncollege.nl::388d0f64-2d47-4e5c-8ec5-f2cea16a3fdd" providerId="AD" clId="Web-{BA301EA0-E136-420E-A7B1-071BFC1BAAC4}" dt="2024-07-08T08:32:17.014" v="11" actId="1076"/>
-          <ac:picMkLst>
-            <pc:docMk/>
-            <pc:sldMk cId="2951057828" sldId="257"/>
-            <ac:picMk id="4" creationId="{2DC40820-644B-A94F-E654-2B23F6518A22}"/>
-          </ac:picMkLst>
-        </pc:picChg>
-        <pc:picChg chg="add mod">
-          <ac:chgData name="Middel, Niek" userId="S::170564@student.horizoncollege.nl::388d0f64-2d47-4e5c-8ec5-f2cea16a3fdd" providerId="AD" clId="Web-{BA301EA0-E136-420E-A7B1-071BFC1BAAC4}" dt="2024-07-08T08:32:14.389" v="10" actId="1076"/>
-          <ac:picMkLst>
-            <pc:docMk/>
-            <pc:sldMk cId="2951057828" sldId="257"/>
-            <ac:picMk id="5" creationId="{B078FA1B-F6A9-0069-18DD-EFE4A34E317E}"/>
-          </ac:picMkLst>
-        </pc:picChg>
-        <pc:picChg chg="add mod">
-          <ac:chgData name="Middel, Niek" userId="S::170564@student.horizoncollege.nl::388d0f64-2d47-4e5c-8ec5-f2cea16a3fdd" providerId="AD" clId="Web-{BA301EA0-E136-420E-A7B1-071BFC1BAAC4}" dt="2024-07-08T08:32:19.421" v="12" actId="1076"/>
-          <ac:picMkLst>
-            <pc:docMk/>
-            <pc:sldMk cId="2951057828" sldId="257"/>
-            <ac:picMk id="6" creationId="{B4BE89C7-88D3-571F-E673-A7CE8EBDD6E2}"/>
-          </ac:picMkLst>
-        </pc:picChg>
-        <pc:picChg chg="add mod">
-          <ac:chgData name="Middel, Niek" userId="S::170564@student.horizoncollege.nl::388d0f64-2d47-4e5c-8ec5-f2cea16a3fdd" providerId="AD" clId="Web-{BA301EA0-E136-420E-A7B1-071BFC1BAAC4}" dt="2024-07-08T08:32:26.640" v="15" actId="1076"/>
-          <ac:picMkLst>
-            <pc:docMk/>
-            <pc:sldMk cId="2951057828" sldId="257"/>
-            <ac:picMk id="7" creationId="{83FDF528-481D-4188-4233-CFD61D978FCF}"/>
-          </ac:picMkLst>
-        </pc:picChg>
-        <pc:picChg chg="add mod">
-          <ac:chgData name="Middel, Niek" userId="S::170564@student.horizoncollege.nl::388d0f64-2d47-4e5c-8ec5-f2cea16a3fdd" providerId="AD" clId="Web-{BA301EA0-E136-420E-A7B1-071BFC1BAAC4}" dt="2024-07-08T08:32:23.874" v="14" actId="1076"/>
-          <ac:picMkLst>
-            <pc:docMk/>
-            <pc:sldMk cId="2951057828" sldId="257"/>
-            <ac:picMk id="8" creationId="{80D64483-B98C-F533-4849-F0FFC5A73B42}"/>
+            <pc:sldMk cId="3351439039" sldId="256"/>
+            <ac:picMk id="5" creationId="{914DF1D3-2B83-5E70-6DA3-465B660926AC}"/>
           </ac:picMkLst>
         </pc:picChg>
       </pc:sldChg>
@@ -307,6 +315,70 @@
     </pc:docChg>
   </pc:docChgLst>
   <pc:docChgLst>
+    <pc:chgData name="Middel, Niek" userId="S::170564@student.horizoncollege.nl::388d0f64-2d47-4e5c-8ec5-f2cea16a3fdd" providerId="AD" clId="Web-{BA301EA0-E136-420E-A7B1-071BFC1BAAC4}"/>
+    <pc:docChg chg="modSld">
+      <pc:chgData name="Middel, Niek" userId="S::170564@student.horizoncollege.nl::388d0f64-2d47-4e5c-8ec5-f2cea16a3fdd" providerId="AD" clId="Web-{BA301EA0-E136-420E-A7B1-071BFC1BAAC4}" dt="2024-07-08T08:32:26.640" v="15" actId="1076"/>
+      <pc:docMkLst>
+        <pc:docMk/>
+      </pc:docMkLst>
+      <pc:sldChg chg="addSp modSp">
+        <pc:chgData name="Middel, Niek" userId="S::170564@student.horizoncollege.nl::388d0f64-2d47-4e5c-8ec5-f2cea16a3fdd" providerId="AD" clId="Web-{BA301EA0-E136-420E-A7B1-071BFC1BAAC4}" dt="2024-07-08T08:32:26.640" v="15" actId="1076"/>
+        <pc:sldMkLst>
+          <pc:docMk/>
+          <pc:sldMk cId="2951057828" sldId="257"/>
+        </pc:sldMkLst>
+        <pc:picChg chg="add mod">
+          <ac:chgData name="Middel, Niek" userId="S::170564@student.horizoncollege.nl::388d0f64-2d47-4e5c-8ec5-f2cea16a3fdd" providerId="AD" clId="Web-{BA301EA0-E136-420E-A7B1-071BFC1BAAC4}" dt="2024-07-08T08:32:20.968" v="13" actId="1076"/>
+          <ac:picMkLst>
+            <pc:docMk/>
+            <pc:sldMk cId="2951057828" sldId="257"/>
+            <ac:picMk id="3" creationId="{5E0E28E1-4675-638B-C3A8-3A7B122E9C38}"/>
+          </ac:picMkLst>
+        </pc:picChg>
+        <pc:picChg chg="mod">
+          <ac:chgData name="Middel, Niek" userId="S::170564@student.horizoncollege.nl::388d0f64-2d47-4e5c-8ec5-f2cea16a3fdd" providerId="AD" clId="Web-{BA301EA0-E136-420E-A7B1-071BFC1BAAC4}" dt="2024-07-08T08:32:17.014" v="11" actId="1076"/>
+          <ac:picMkLst>
+            <pc:docMk/>
+            <pc:sldMk cId="2951057828" sldId="257"/>
+            <ac:picMk id="4" creationId="{2DC40820-644B-A94F-E654-2B23F6518A22}"/>
+          </ac:picMkLst>
+        </pc:picChg>
+        <pc:picChg chg="add mod">
+          <ac:chgData name="Middel, Niek" userId="S::170564@student.horizoncollege.nl::388d0f64-2d47-4e5c-8ec5-f2cea16a3fdd" providerId="AD" clId="Web-{BA301EA0-E136-420E-A7B1-071BFC1BAAC4}" dt="2024-07-08T08:32:14.389" v="10" actId="1076"/>
+          <ac:picMkLst>
+            <pc:docMk/>
+            <pc:sldMk cId="2951057828" sldId="257"/>
+            <ac:picMk id="5" creationId="{B078FA1B-F6A9-0069-18DD-EFE4A34E317E}"/>
+          </ac:picMkLst>
+        </pc:picChg>
+        <pc:picChg chg="add mod">
+          <ac:chgData name="Middel, Niek" userId="S::170564@student.horizoncollege.nl::388d0f64-2d47-4e5c-8ec5-f2cea16a3fdd" providerId="AD" clId="Web-{BA301EA0-E136-420E-A7B1-071BFC1BAAC4}" dt="2024-07-08T08:32:19.421" v="12" actId="1076"/>
+          <ac:picMkLst>
+            <pc:docMk/>
+            <pc:sldMk cId="2951057828" sldId="257"/>
+            <ac:picMk id="6" creationId="{B4BE89C7-88D3-571F-E673-A7CE8EBDD6E2}"/>
+          </ac:picMkLst>
+        </pc:picChg>
+        <pc:picChg chg="add mod">
+          <ac:chgData name="Middel, Niek" userId="S::170564@student.horizoncollege.nl::388d0f64-2d47-4e5c-8ec5-f2cea16a3fdd" providerId="AD" clId="Web-{BA301EA0-E136-420E-A7B1-071BFC1BAAC4}" dt="2024-07-08T08:32:26.640" v="15" actId="1076"/>
+          <ac:picMkLst>
+            <pc:docMk/>
+            <pc:sldMk cId="2951057828" sldId="257"/>
+            <ac:picMk id="7" creationId="{83FDF528-481D-4188-4233-CFD61D978FCF}"/>
+          </ac:picMkLst>
+        </pc:picChg>
+        <pc:picChg chg="add mod">
+          <ac:chgData name="Middel, Niek" userId="S::170564@student.horizoncollege.nl::388d0f64-2d47-4e5c-8ec5-f2cea16a3fdd" providerId="AD" clId="Web-{BA301EA0-E136-420E-A7B1-071BFC1BAAC4}" dt="2024-07-08T08:32:23.874" v="14" actId="1076"/>
+          <ac:picMkLst>
+            <pc:docMk/>
+            <pc:sldMk cId="2951057828" sldId="257"/>
+            <ac:picMk id="8" creationId="{80D64483-B98C-F533-4849-F0FFC5A73B42}"/>
+          </ac:picMkLst>
+        </pc:picChg>
+      </pc:sldChg>
+    </pc:docChg>
+  </pc:docChgLst>
+  <pc:docChgLst>
     <pc:chgData name="Middel, Niek" userId="S::170564@student.horizoncollege.nl::388d0f64-2d47-4e5c-8ec5-f2cea16a3fdd" providerId="AD" clId="Web-{857487CA-A0CF-4093-BB45-8BD0727D0E2F}"/>
     <pc:docChg chg="addSld modSld">
       <pc:chgData name="Middel, Niek" userId="S::170564@student.horizoncollege.nl::388d0f64-2d47-4e5c-8ec5-f2cea16a3fdd" providerId="AD" clId="Web-{857487CA-A0CF-4093-BB45-8BD0727D0E2F}" dt="2024-07-08T08:19:21.182" v="1"/>
@@ -333,78 +405,6 @@
             <pc:docMk/>
             <pc:sldMk cId="2951057828" sldId="257"/>
             <ac:picMk id="4" creationId="{2DC40820-644B-A94F-E654-2B23F6518A22}"/>
-          </ac:picMkLst>
-        </pc:picChg>
-      </pc:sldChg>
-    </pc:docChg>
-  </pc:docChgLst>
-  <pc:docChgLst>
-    <pc:chgData name="Middel, Niek" userId="S::170564@student.horizoncollege.nl::388d0f64-2d47-4e5c-8ec5-f2cea16a3fdd" providerId="AD" clId="Web-{2BF36AF2-3E90-412A-87CF-022F1E0C6D66}"/>
-    <pc:docChg chg="modSld">
-      <pc:chgData name="Middel, Niek" userId="S::170564@student.horizoncollege.nl::388d0f64-2d47-4e5c-8ec5-f2cea16a3fdd" providerId="AD" clId="Web-{2BF36AF2-3E90-412A-87CF-022F1E0C6D66}" dt="2024-07-08T08:46:15.267" v="0"/>
-      <pc:docMkLst>
-        <pc:docMk/>
-      </pc:docMkLst>
-      <pc:sldChg chg="addSp modSp mod setBg">
-        <pc:chgData name="Middel, Niek" userId="S::170564@student.horizoncollege.nl::388d0f64-2d47-4e5c-8ec5-f2cea16a3fdd" providerId="AD" clId="Web-{2BF36AF2-3E90-412A-87CF-022F1E0C6D66}" dt="2024-07-08T08:46:15.267" v="0"/>
-        <pc:sldMkLst>
-          <pc:docMk/>
-          <pc:sldMk cId="3351439039" sldId="256"/>
-        </pc:sldMkLst>
-        <pc:spChg chg="mod">
-          <ac:chgData name="Middel, Niek" userId="S::170564@student.horizoncollege.nl::388d0f64-2d47-4e5c-8ec5-f2cea16a3fdd" providerId="AD" clId="Web-{2BF36AF2-3E90-412A-87CF-022F1E0C6D66}" dt="2024-07-08T08:46:15.267" v="0"/>
-          <ac:spMkLst>
-            <pc:docMk/>
-            <pc:sldMk cId="3351439039" sldId="256"/>
-            <ac:spMk id="2" creationId="{00000000-0000-0000-0000-000000000000}"/>
-          </ac:spMkLst>
-        </pc:spChg>
-        <pc:spChg chg="mod">
-          <ac:chgData name="Middel, Niek" userId="S::170564@student.horizoncollege.nl::388d0f64-2d47-4e5c-8ec5-f2cea16a3fdd" providerId="AD" clId="Web-{2BF36AF2-3E90-412A-87CF-022F1E0C6D66}" dt="2024-07-08T08:46:15.267" v="0"/>
-          <ac:spMkLst>
-            <pc:docMk/>
-            <pc:sldMk cId="3351439039" sldId="256"/>
-            <ac:spMk id="3" creationId="{00000000-0000-0000-0000-000000000000}"/>
-          </ac:spMkLst>
-        </pc:spChg>
-        <pc:spChg chg="add">
-          <ac:chgData name="Middel, Niek" userId="S::170564@student.horizoncollege.nl::388d0f64-2d47-4e5c-8ec5-f2cea16a3fdd" providerId="AD" clId="Web-{2BF36AF2-3E90-412A-87CF-022F1E0C6D66}" dt="2024-07-08T08:46:15.267" v="0"/>
-          <ac:spMkLst>
-            <pc:docMk/>
-            <pc:sldMk cId="3351439039" sldId="256"/>
-            <ac:spMk id="9" creationId="{0671A8AE-40A1-4631-A6B8-581AFF065482}"/>
-          </ac:spMkLst>
-        </pc:spChg>
-        <pc:spChg chg="add">
-          <ac:chgData name="Middel, Niek" userId="S::170564@student.horizoncollege.nl::388d0f64-2d47-4e5c-8ec5-f2cea16a3fdd" providerId="AD" clId="Web-{2BF36AF2-3E90-412A-87CF-022F1E0C6D66}" dt="2024-07-08T08:46:15.267" v="0"/>
-          <ac:spMkLst>
-            <pc:docMk/>
-            <pc:sldMk cId="3351439039" sldId="256"/>
-            <ac:spMk id="11" creationId="{AB58EF07-17C2-48CF-ABB0-EEF1F17CB8F0}"/>
-          </ac:spMkLst>
-        </pc:spChg>
-        <pc:spChg chg="add">
-          <ac:chgData name="Middel, Niek" userId="S::170564@student.horizoncollege.nl::388d0f64-2d47-4e5c-8ec5-f2cea16a3fdd" providerId="AD" clId="Web-{2BF36AF2-3E90-412A-87CF-022F1E0C6D66}" dt="2024-07-08T08:46:15.267" v="0"/>
-          <ac:spMkLst>
-            <pc:docMk/>
-            <pc:sldMk cId="3351439039" sldId="256"/>
-            <ac:spMk id="13" creationId="{AF2F604E-43BE-4DC3-B983-E071523364F8}"/>
-          </ac:spMkLst>
-        </pc:spChg>
-        <pc:spChg chg="add">
-          <ac:chgData name="Middel, Niek" userId="S::170564@student.horizoncollege.nl::388d0f64-2d47-4e5c-8ec5-f2cea16a3fdd" providerId="AD" clId="Web-{2BF36AF2-3E90-412A-87CF-022F1E0C6D66}" dt="2024-07-08T08:46:15.267" v="0"/>
-          <ac:spMkLst>
-            <pc:docMk/>
-            <pc:sldMk cId="3351439039" sldId="256"/>
-            <ac:spMk id="15" creationId="{08C9B587-E65E-4B52-B37C-ABEBB6E87928}"/>
-          </ac:spMkLst>
-        </pc:spChg>
-        <pc:picChg chg="add">
-          <ac:chgData name="Middel, Niek" userId="S::170564@student.horizoncollege.nl::388d0f64-2d47-4e5c-8ec5-f2cea16a3fdd" providerId="AD" clId="Web-{2BF36AF2-3E90-412A-87CF-022F1E0C6D66}" dt="2024-07-08T08:46:15.267" v="0"/>
-          <ac:picMkLst>
-            <pc:docMk/>
-            <pc:sldMk cId="3351439039" sldId="256"/>
-            <ac:picMk id="5" creationId="{914DF1D3-2B83-5E70-6DA3-465B660926AC}"/>
           </ac:picMkLst>
         </pc:picChg>
       </pc:sldChg>
@@ -1640,7 +1640,7 @@
           <a:p>
             <a:fld id="{CA953BDC-9EAE-49FE-9892-958C9F845175}" type="datetimeFigureOut">
               <a:rPr lang="de-DE" smtClean="0"/>
-              <a:t>08.07.2024</a:t>
+              <a:t>10.07.2024</a:t>
             </a:fld>
             <a:endParaRPr lang="de-DE"/>
           </a:p>
@@ -1810,7 +1810,7 @@
           <a:p>
             <a:fld id="{CA953BDC-9EAE-49FE-9892-958C9F845175}" type="datetimeFigureOut">
               <a:rPr lang="de-DE" smtClean="0"/>
-              <a:t>08.07.2024</a:t>
+              <a:t>10.07.2024</a:t>
             </a:fld>
             <a:endParaRPr lang="de-DE"/>
           </a:p>
@@ -1990,7 +1990,7 @@
           <a:p>
             <a:fld id="{CA953BDC-9EAE-49FE-9892-958C9F845175}" type="datetimeFigureOut">
               <a:rPr lang="de-DE" smtClean="0"/>
-              <a:t>08.07.2024</a:t>
+              <a:t>10.07.2024</a:t>
             </a:fld>
             <a:endParaRPr lang="de-DE"/>
           </a:p>
@@ -2160,7 +2160,7 @@
           <a:p>
             <a:fld id="{CA953BDC-9EAE-49FE-9892-958C9F845175}" type="datetimeFigureOut">
               <a:rPr lang="de-DE" smtClean="0"/>
-              <a:t>08.07.2024</a:t>
+              <a:t>10.07.2024</a:t>
             </a:fld>
             <a:endParaRPr lang="de-DE"/>
           </a:p>
@@ -2406,7 +2406,7 @@
           <a:p>
             <a:fld id="{CA953BDC-9EAE-49FE-9892-958C9F845175}" type="datetimeFigureOut">
               <a:rPr lang="de-DE" smtClean="0"/>
-              <a:t>08.07.2024</a:t>
+              <a:t>10.07.2024</a:t>
             </a:fld>
             <a:endParaRPr lang="de-DE"/>
           </a:p>
@@ -2638,7 +2638,7 @@
           <a:p>
             <a:fld id="{CA953BDC-9EAE-49FE-9892-958C9F845175}" type="datetimeFigureOut">
               <a:rPr lang="de-DE" smtClean="0"/>
-              <a:t>08.07.2024</a:t>
+              <a:t>10.07.2024</a:t>
             </a:fld>
             <a:endParaRPr lang="de-DE"/>
           </a:p>
@@ -3005,7 +3005,7 @@
           <a:p>
             <a:fld id="{CA953BDC-9EAE-49FE-9892-958C9F845175}" type="datetimeFigureOut">
               <a:rPr lang="de-DE" smtClean="0"/>
-              <a:t>08.07.2024</a:t>
+              <a:t>10.07.2024</a:t>
             </a:fld>
             <a:endParaRPr lang="de-DE"/>
           </a:p>
@@ -3123,7 +3123,7 @@
           <a:p>
             <a:fld id="{CA953BDC-9EAE-49FE-9892-958C9F845175}" type="datetimeFigureOut">
               <a:rPr lang="de-DE" smtClean="0"/>
-              <a:t>08.07.2024</a:t>
+              <a:t>10.07.2024</a:t>
             </a:fld>
             <a:endParaRPr lang="de-DE"/>
           </a:p>
@@ -3218,7 +3218,7 @@
           <a:p>
             <a:fld id="{CA953BDC-9EAE-49FE-9892-958C9F845175}" type="datetimeFigureOut">
               <a:rPr lang="de-DE" smtClean="0"/>
-              <a:t>08.07.2024</a:t>
+              <a:t>10.07.2024</a:t>
             </a:fld>
             <a:endParaRPr lang="de-DE"/>
           </a:p>
@@ -3495,7 +3495,7 @@
           <a:p>
             <a:fld id="{CA953BDC-9EAE-49FE-9892-958C9F845175}" type="datetimeFigureOut">
               <a:rPr lang="de-DE" smtClean="0"/>
-              <a:t>08.07.2024</a:t>
+              <a:t>10.07.2024</a:t>
             </a:fld>
             <a:endParaRPr lang="de-DE"/>
           </a:p>
@@ -3748,7 +3748,7 @@
           <a:p>
             <a:fld id="{CA953BDC-9EAE-49FE-9892-958C9F845175}" type="datetimeFigureOut">
               <a:rPr lang="de-DE" smtClean="0"/>
-              <a:t>08.07.2024</a:t>
+              <a:t>10.07.2024</a:t>
             </a:fld>
             <a:endParaRPr lang="de-DE"/>
           </a:p>
@@ -3961,7 +3961,7 @@
           <a:p>
             <a:fld id="{CA953BDC-9EAE-49FE-9892-958C9F845175}" type="datetimeFigureOut">
               <a:rPr lang="de-DE" smtClean="0"/>
-              <a:t>08.07.2024</a:t>
+              <a:t>10.07.2024</a:t>
             </a:fld>
             <a:endParaRPr lang="de-DE"/>
           </a:p>
@@ -4591,15 +4591,15 @@
           <a:p>
             <a:pPr algn="ctr"/>
             <a:r>
-              <a:rPr lang="en-US" sz="5200">
+              <a:rPr lang="en-US" sz="5200" dirty="0">
                 <a:solidFill>
                   <a:srgbClr val="FFFFFF"/>
                 </a:solidFill>
               </a:rPr>
-              <a:t>Raspberry-</a:t>
+              <a:t>Raspberry pi </a:t>
             </a:r>
             <a:r>
-              <a:rPr lang="en-US" sz="5200" err="1">
+              <a:rPr lang="en-US" sz="5200" dirty="0" err="1">
                 <a:solidFill>
                   <a:srgbClr val="FFFFFF"/>
                 </a:solidFill>
@@ -4607,7 +4607,7 @@
               <a:t>pico</a:t>
             </a:r>
             <a:r>
-              <a:rPr lang="en-US" sz="5200">
+              <a:rPr lang="en-US" sz="5200" dirty="0">
                 <a:solidFill>
                   <a:srgbClr val="FFFFFF"/>
                 </a:solidFill>
@@ -5592,7 +5592,7 @@
                   <a:schemeClr val="bg1"/>
                 </a:solidFill>
               </a:rPr>
-              <a:t>Code (slide x 4)</a:t>
+              <a:t>Code (slide 4)</a:t>
             </a:r>
           </a:p>
           <a:p>
@@ -5602,23 +5602,7 @@
                   <a:schemeClr val="bg1"/>
                 </a:solidFill>
               </a:rPr>
-              <a:t>Testing </a:t>
-            </a:r>
-            <a:r>
-              <a:rPr lang="en-US" sz="2200">
-                <a:solidFill>
-                  <a:schemeClr val="bg1"/>
-                </a:solidFill>
-              </a:rPr>
-              <a:t>controller windows 10 </a:t>
-            </a:r>
-            <a:r>
-              <a:rPr lang="en-US" sz="2200" dirty="0">
-                <a:solidFill>
-                  <a:schemeClr val="bg1"/>
-                </a:solidFill>
-              </a:rPr>
-              <a:t>(slide 5 to slide 6)</a:t>
+              <a:t>Testing controller windows 10 (slide 5 to slide 6)</a:t>
             </a:r>
           </a:p>
           <a:p>
@@ -5849,6 +5833,42 @@
           </a:p>
         </p:txBody>
       </p:sp>
+      <p:pic>
+        <p:nvPicPr>
+          <p:cNvPr id="7" name="Picture 6" descr="A circuit board with wires and wires&#10;&#10;Description automatically generated">
+            <a:extLst>
+              <a:ext uri="{FF2B5EF4-FFF2-40B4-BE49-F238E27FC236}">
+                <a16:creationId xmlns:a16="http://schemas.microsoft.com/office/drawing/2014/main" id="{BE6DF2C2-3CB9-D242-6261-76C5691455D4}"/>
+              </a:ext>
+            </a:extLst>
+          </p:cNvPr>
+          <p:cNvPicPr>
+            <a:picLocks noChangeAspect="1"/>
+          </p:cNvPicPr>
+          <p:nvPr/>
+        </p:nvPicPr>
+        <p:blipFill>
+          <a:blip r:embed="rId3">
+            <a:extLst>
+              <a:ext uri="{28A0092B-C50C-407E-A947-70E740481C1C}">
+                <a14:useLocalDpi xmlns:a14="http://schemas.microsoft.com/office/drawing/2010/main" val="0"/>
+              </a:ext>
+            </a:extLst>
+          </a:blip>
+          <a:stretch>
+            <a:fillRect/>
+          </a:stretch>
+        </p:blipFill>
+        <p:spPr>
+          <a:xfrm>
+            <a:off x="2162584" y="2868033"/>
+            <a:ext cx="7524904" cy="3707924"/>
+          </a:xfrm>
+          <a:prstGeom prst="rect">
+            <a:avLst/>
+          </a:prstGeom>
+        </p:spPr>
+      </p:pic>
       <p:sp>
         <p:nvSpPr>
           <p:cNvPr id="20" name="sketchy line">
@@ -6437,7 +6457,7 @@
         </p:nvSpPr>
         <p:spPr>
           <a:xfrm>
-            <a:off x="10855454" y="5059145"/>
+            <a:off x="10670332" y="5059145"/>
             <a:ext cx="3043335" cy="2493283"/>
           </a:xfrm>
           <a:prstGeom prst="rect">
@@ -6614,7 +6634,7 @@
           </a:lstStyle>
           <a:p>
             <a:r>
-              <a:rPr lang="en-US" sz="1200">
+              <a:rPr lang="en-US" sz="1200" dirty="0">
                 <a:solidFill>
                   <a:schemeClr val="bg1"/>
                 </a:solidFill>
@@ -6627,7 +6647,7 @@
               <a:buNone/>
             </a:pPr>
             <a:r>
-              <a:rPr lang="en-US" sz="1200">
+              <a:rPr lang="en-US" sz="1200" dirty="0">
                 <a:solidFill>
                   <a:schemeClr val="bg1"/>
                 </a:solidFill>
@@ -6640,7 +6660,7 @@
               <a:buNone/>
             </a:pPr>
             <a:r>
-              <a:rPr lang="en-US" sz="1200">
+              <a:rPr lang="en-US" sz="1200" dirty="0">
                 <a:solidFill>
                   <a:schemeClr val="bg1"/>
                 </a:solidFill>
@@ -6653,7 +6673,7 @@
               <a:buNone/>
             </a:pPr>
             <a:r>
-              <a:rPr lang="en-US" sz="1200">
+              <a:rPr lang="en-US" sz="1200" dirty="0">
                 <a:solidFill>
                   <a:schemeClr val="bg1"/>
                 </a:solidFill>
@@ -6666,7 +6686,7 @@
               <a:buNone/>
             </a:pPr>
             <a:r>
-              <a:rPr lang="en-US" sz="1200">
+              <a:rPr lang="en-US" sz="1200" dirty="0">
                 <a:solidFill>
                   <a:schemeClr val="bg1"/>
                 </a:solidFill>
@@ -6679,36 +6699,36 @@
               <a:buNone/>
             </a:pPr>
             <a:r>
-              <a:rPr lang="en-US" sz="1200">
+              <a:rPr lang="en-US" sz="1200" dirty="0">
                 <a:solidFill>
                   <a:schemeClr val="bg1"/>
                 </a:solidFill>
               </a:rPr>
-              <a:t>- 1 raspberry-</a:t>
+              <a:t>- 1 raspberry pi </a:t>
             </a:r>
             <a:r>
-              <a:rPr lang="en-US" sz="1200" err="1">
+              <a:rPr lang="en-US" sz="1200" dirty="0" err="1">
                 <a:solidFill>
                   <a:schemeClr val="bg1"/>
                 </a:solidFill>
               </a:rPr>
               <a:t>pico</a:t>
             </a:r>
-            <a:endParaRPr lang="en-US" sz="1200">
+            <a:endParaRPr lang="en-US" sz="1200" dirty="0">
               <a:solidFill>
                 <a:schemeClr val="bg1"/>
               </a:solidFill>
             </a:endParaRPr>
           </a:p>
           <a:p>
-            <a:endParaRPr lang="en-US" sz="2200">
+            <a:endParaRPr lang="en-US" sz="2200" dirty="0">
               <a:solidFill>
                 <a:schemeClr val="bg1"/>
               </a:solidFill>
             </a:endParaRPr>
           </a:p>
           <a:p>
-            <a:endParaRPr lang="en-US" sz="2200">
+            <a:endParaRPr lang="en-US" sz="2200" dirty="0">
               <a:solidFill>
                 <a:schemeClr val="bg1"/>
               </a:solidFill>
@@ -6716,35 +6736,6 @@
           </a:p>
         </p:txBody>
       </p:sp>
-      <p:pic>
-        <p:nvPicPr>
-          <p:cNvPr id="2" name="Tijdelijke aanduiding voor inhoud 3" descr="Afbeelding met tekst, elektronica, Elektronische engineering, engineering&#10;&#10;Automatisch gegenereerde beschrijving">
-            <a:extLst>
-              <a:ext uri="{FF2B5EF4-FFF2-40B4-BE49-F238E27FC236}">
-                <a16:creationId xmlns:a16="http://schemas.microsoft.com/office/drawing/2014/main" id="{C659D4A6-DC28-FB7C-3394-A3361D1E5A03}"/>
-              </a:ext>
-            </a:extLst>
-          </p:cNvPr>
-          <p:cNvPicPr>
-            <a:picLocks noGrp="1" noChangeAspect="1"/>
-          </p:cNvPicPr>
-          <p:nvPr>
-            <p:ph idx="1"/>
-          </p:nvPr>
-        </p:nvPicPr>
-        <p:blipFill>
-          <a:blip r:embed="rId3"/>
-          <a:stretch>
-            <a:fillRect/>
-          </a:stretch>
-        </p:blipFill>
-        <p:spPr>
-          <a:xfrm>
-            <a:off x="2174211" y="1909648"/>
-            <a:ext cx="7657315" cy="4948342"/>
-          </a:xfrm>
-        </p:spPr>
-      </p:pic>
       <p:sp>
         <p:nvSpPr>
           <p:cNvPr id="3" name="TextBox 2">
@@ -6799,9 +6790,9 @@
           <p:nvPr/>
         </p:nvCxnSpPr>
         <p:spPr>
-          <a:xfrm>
-            <a:off x="4254760" y="4488024"/>
-            <a:ext cx="419877" cy="0"/>
+          <a:xfrm flipV="1">
+            <a:off x="4064125" y="5957010"/>
+            <a:ext cx="810038" cy="348775"/>
           </a:xfrm>
           <a:prstGeom prst="straightConnector1">
             <a:avLst/>
@@ -6839,7 +6830,7 @@
         </p:nvSpPr>
         <p:spPr>
           <a:xfrm>
-            <a:off x="3230832" y="4292414"/>
+            <a:off x="3090724" y="6167286"/>
             <a:ext cx="1105678" cy="276999"/>
           </a:xfrm>
           <a:prstGeom prst="rect">
@@ -6854,7 +6845,11 @@
           <a:lstStyle/>
           <a:p>
             <a:r>
-              <a:rPr lang="en-US" sz="1200"/>
+              <a:rPr lang="en-US" sz="1200" dirty="0">
+                <a:solidFill>
+                  <a:schemeClr val="bg1"/>
+                </a:solidFill>
+              </a:rPr>
               <a:t>Ground cable</a:t>
             </a:r>
           </a:p>
@@ -6869,13 +6864,15 @@
               </a:ext>
             </a:extLst>
           </p:cNvPr>
-          <p:cNvCxnSpPr/>
+          <p:cNvCxnSpPr>
+            <a:cxnSpLocks/>
+          </p:cNvCxnSpPr>
           <p:nvPr/>
         </p:nvCxnSpPr>
         <p:spPr>
-          <a:xfrm>
-            <a:off x="3877056" y="3712464"/>
-            <a:ext cx="938784" cy="420624"/>
+          <a:xfrm flipH="1">
+            <a:off x="6632218" y="3221050"/>
+            <a:ext cx="466355" cy="528749"/>
           </a:xfrm>
           <a:prstGeom prst="straightConnector1">
             <a:avLst/>
@@ -6913,7 +6910,7 @@
         </p:nvSpPr>
         <p:spPr>
           <a:xfrm>
-            <a:off x="3249177" y="3573954"/>
+            <a:off x="7101620" y="3078483"/>
             <a:ext cx="1105678" cy="276999"/>
           </a:xfrm>
           <a:prstGeom prst="rect">
@@ -6928,7 +6925,11 @@
           <a:lstStyle/>
           <a:p>
             <a:r>
-              <a:rPr lang="en-US" sz="1200"/>
+              <a:rPr lang="en-US" sz="1200" dirty="0">
+                <a:solidFill>
+                  <a:schemeClr val="bg1"/>
+                </a:solidFill>
+              </a:rPr>
               <a:t>resistor</a:t>
             </a:r>
           </a:p>
@@ -6950,7 +6951,7 @@
         </p:nvCxnSpPr>
         <p:spPr>
           <a:xfrm rot="5400000">
-            <a:off x="6803796" y="3188667"/>
+            <a:off x="8492471" y="4264555"/>
             <a:ext cx="1039773" cy="676654"/>
           </a:xfrm>
           <a:prstGeom prst="bentConnector3">
@@ -6991,7 +6992,7 @@
         </p:nvSpPr>
         <p:spPr>
           <a:xfrm>
-            <a:off x="7247358" y="2772642"/>
+            <a:off x="9114968" y="3808304"/>
             <a:ext cx="1853232" cy="276999"/>
           </a:xfrm>
           <a:prstGeom prst="rect">
@@ -7006,7 +7007,11 @@
           <a:lstStyle/>
           <a:p>
             <a:r>
-              <a:rPr lang="en-US" sz="1200"/>
+              <a:rPr lang="en-US" sz="1200" dirty="0">
+                <a:solidFill>
+                  <a:schemeClr val="bg1"/>
+                </a:solidFill>
+              </a:rPr>
               <a:t>Goes a to j (horizontally)</a:t>
             </a:r>
           </a:p>
@@ -7026,7 +7031,7 @@
         </p:nvCxnSpPr>
         <p:spPr>
           <a:xfrm>
-            <a:off x="4559808" y="2414239"/>
+            <a:off x="3138746" y="3279224"/>
             <a:ext cx="2115312" cy="470575"/>
           </a:xfrm>
           <a:prstGeom prst="bentConnector3">
@@ -7067,7 +7072,7 @@
         </p:nvSpPr>
         <p:spPr>
           <a:xfrm>
-            <a:off x="2875400" y="2254913"/>
+            <a:off x="1499314" y="3133124"/>
             <a:ext cx="1853232" cy="276999"/>
           </a:xfrm>
           <a:prstGeom prst="rect">
@@ -7082,7 +7087,11 @@
           <a:lstStyle/>
           <a:p>
             <a:r>
-              <a:rPr lang="en-US" sz="1200"/>
+              <a:rPr lang="en-US" sz="1200" dirty="0">
+                <a:solidFill>
+                  <a:schemeClr val="bg1"/>
+                </a:solidFill>
+              </a:rPr>
               <a:t>Goes 1 to 30 (vertically)</a:t>
             </a:r>
           </a:p>

</xml_diff>